<commit_message>
Aggiunta slide linguaggi scelti
</commit_message>
<xml_diff>
--- a/presentazione.pptx
+++ b/presentazione.pptx
@@ -8,11 +8,12 @@
     <p:sldId id="256" r:id="rId2"/>
     <p:sldId id="257" r:id="rId3"/>
     <p:sldId id="258" r:id="rId4"/>
-    <p:sldId id="259" r:id="rId5"/>
-    <p:sldId id="260" r:id="rId6"/>
-    <p:sldId id="261" r:id="rId7"/>
-    <p:sldId id="262" r:id="rId8"/>
-    <p:sldId id="263" r:id="rId9"/>
+    <p:sldId id="264" r:id="rId5"/>
+    <p:sldId id="259" r:id="rId6"/>
+    <p:sldId id="260" r:id="rId7"/>
+    <p:sldId id="261" r:id="rId8"/>
+    <p:sldId id="262" r:id="rId9"/>
+    <p:sldId id="263" r:id="rId10"/>
   </p:sldIdLst>
   <p:sldSz cx="12192000" cy="6858000"/>
   <p:notesSz cx="6858000" cy="9144000"/>
@@ -111,6 +112,11 @@
       </a:defRPr>
     </a:lvl9pPr>
   </p:defaultTextStyle>
+  <p:extLst>
+    <p:ext uri="{EFAFB233-063F-42B5-8137-9DF3F51BA10A}">
+      <p15:sldGuideLst xmlns:p15="http://schemas.microsoft.com/office/powerpoint/2012/main"/>
+    </p:ext>
+  </p:extLst>
 </p:presentation>
 </file>
 
@@ -384,7 +390,7 @@
           <a:p>
             <a:fld id="{1160EA64-D806-43AC-9DF2-F8C432F32B4C}" type="datetimeFigureOut">
               <a:rPr lang="en-US" dirty="0"/>
-              <a:t>5/24/2018</a:t>
+              <a:t>6/4/2018</a:t>
             </a:fld>
             <a:endParaRPr lang="en-US" dirty="0"/>
           </a:p>
@@ -550,7 +556,7 @@
           <a:p>
             <a:fld id="{E9F9C37B-1D36-470B-8223-D6C91242EC14}" type="datetimeFigureOut">
               <a:rPr lang="en-US" dirty="0"/>
-              <a:t>5/24/2018</a:t>
+              <a:t>6/4/2018</a:t>
             </a:fld>
             <a:endParaRPr lang="en-US" dirty="0"/>
           </a:p>
@@ -725,7 +731,7 @@
           <a:p>
             <a:fld id="{67C6F52A-A82B-47A2-A83A-8C4C91F2D59F}" type="datetimeFigureOut">
               <a:rPr lang="en-US" dirty="0"/>
-              <a:t>5/24/2018</a:t>
+              <a:t>6/4/2018</a:t>
             </a:fld>
             <a:endParaRPr lang="en-US" dirty="0"/>
           </a:p>
@@ -890,7 +896,7 @@
           <a:p>
             <a:fld id="{F070A7B3-6521-4DCA-87E5-044747A908C1}" type="datetimeFigureOut">
               <a:rPr lang="en-US" dirty="0"/>
-              <a:t>5/24/2018</a:t>
+              <a:t>6/4/2018</a:t>
             </a:fld>
             <a:endParaRPr lang="en-US" dirty="0"/>
           </a:p>
@@ -1154,7 +1160,7 @@
           <a:p>
             <a:fld id="{1160EA64-D806-43AC-9DF2-F8C432F32B4C}" type="datetimeFigureOut">
               <a:rPr lang="en-US" dirty="0"/>
-              <a:t>5/24/2018</a:t>
+              <a:t>6/4/2018</a:t>
             </a:fld>
             <a:endParaRPr lang="en-US" dirty="0"/>
           </a:p>
@@ -1382,7 +1388,7 @@
           <a:p>
             <a:fld id="{AB134690-1557-4C89-A502-4959FE7FAD70}" type="datetimeFigureOut">
               <a:rPr lang="en-US" dirty="0"/>
-              <a:t>5/24/2018</a:t>
+              <a:t>6/4/2018</a:t>
             </a:fld>
             <a:endParaRPr lang="en-US" dirty="0"/>
           </a:p>
@@ -1732,7 +1738,7 @@
           <a:p>
             <a:fld id="{4F7D4976-E339-4826-83B7-FBD03F55ECF8}" type="datetimeFigureOut">
               <a:rPr lang="en-US" dirty="0"/>
-              <a:t>5/24/2018</a:t>
+              <a:t>6/4/2018</a:t>
             </a:fld>
             <a:endParaRPr lang="en-US" dirty="0"/>
           </a:p>
@@ -1868,7 +1874,7 @@
           <a:p>
             <a:fld id="{E1037C31-9E7A-4F99-8774-A0E530DE1A42}" type="datetimeFigureOut">
               <a:rPr lang="en-US" dirty="0"/>
-              <a:t>5/24/2018</a:t>
+              <a:t>6/4/2018</a:t>
             </a:fld>
             <a:endParaRPr lang="en-US" dirty="0"/>
           </a:p>
@@ -1958,7 +1964,7 @@
           <a:p>
             <a:fld id="{C278504F-A551-4DE0-9316-4DCD1D8CC752}" type="datetimeFigureOut">
               <a:rPr lang="en-US" dirty="0"/>
-              <a:t>5/24/2018</a:t>
+              <a:t>6/4/2018</a:t>
             </a:fld>
             <a:endParaRPr lang="en-US" dirty="0"/>
           </a:p>
@@ -2310,7 +2316,7 @@
           <a:p>
             <a:fld id="{1160EA64-D806-43AC-9DF2-F8C432F32B4C}" type="datetimeFigureOut">
               <a:rPr lang="en-US" dirty="0"/>
-              <a:t>5/24/2018</a:t>
+              <a:t>6/4/2018</a:t>
             </a:fld>
             <a:endParaRPr lang="en-US" dirty="0"/>
           </a:p>
@@ -2663,7 +2669,7 @@
             <a:fld id="{1160EA64-D806-43AC-9DF2-F8C432F32B4C}" type="datetimeFigureOut">
               <a:rPr lang="en-US" dirty="0"/>
               <a:pPr/>
-              <a:t>5/24/2018</a:t>
+              <a:t>6/4/2018</a:t>
             </a:fld>
             <a:endParaRPr lang="en-US" dirty="0"/>
           </a:p>
@@ -2898,7 +2904,7 @@
           <a:p>
             <a:fld id="{1160EA64-D806-43AC-9DF2-F8C432F32B4C}" type="datetimeFigureOut">
               <a:rPr lang="en-US" dirty="0"/>
-              <a:t>5/24/2018</a:t>
+              <a:t>6/4/2018</a:t>
             </a:fld>
             <a:endParaRPr lang="en-US" dirty="0"/>
           </a:p>
@@ -3866,7 +3872,7 @@
         </p:spPr>
         <p:txBody>
           <a:bodyPr>
-            <a:normAutofit/>
+            <a:normAutofit fontScale="92500" lnSpcReduction="20000"/>
           </a:bodyPr>
           <a:lstStyle/>
           <a:p>
@@ -3889,21 +3895,51 @@
           <a:p>
             <a:r>
               <a:rPr lang="it-IT" sz="2400" dirty="0"/>
-              <a:t>Julia inizialmente sembrava fico (a Nicolò)</a:t>
+              <a:t>Julia inizialmente sembrava fico (e veloce)</a:t>
             </a:r>
           </a:p>
           <a:p>
             <a:pPr lvl="1"/>
             <a:r>
               <a:rPr lang="it-IT" sz="2200" dirty="0"/>
-              <a:t>Linguaggio nuovo con metalinguaggio a compilazione JIT direttamente in codice macchina</a:t>
+              <a:t>Linguaggio nuovo, multi-paradigma, a compilazione JIT direttamente in codice macchina</a:t>
             </a:r>
           </a:p>
           <a:p>
             <a:pPr lvl="1"/>
             <a:r>
               <a:rPr lang="it-IT" sz="2200" dirty="0"/>
-              <a:t>Abbiamo visto che il supporto è scarso e in realtà non funziona così bene</a:t>
+              <a:t>Abbiamo visto che:</a:t>
+            </a:r>
+          </a:p>
+          <a:p>
+            <a:pPr lvl="2"/>
+            <a:r>
+              <a:rPr lang="it-IT" sz="2200" dirty="0"/>
+              <a:t>il supporto è scarso (~4K domande </a:t>
+            </a:r>
+            <a:r>
+              <a:rPr lang="it-IT" sz="2200" dirty="0" err="1"/>
+              <a:t>StackOverflow</a:t>
+            </a:r>
+            <a:r>
+              <a:rPr lang="it-IT" sz="2200" dirty="0"/>
+              <a:t>, </a:t>
+            </a:r>
+            <a:r>
+              <a:rPr lang="it-IT" sz="2200" dirty="0" err="1"/>
+              <a:t>Javascript</a:t>
+            </a:r>
+            <a:r>
+              <a:rPr lang="it-IT" sz="2200" dirty="0"/>
+              <a:t> ha ~1,6M domande)</a:t>
+            </a:r>
+          </a:p>
+          <a:p>
+            <a:pPr lvl="2"/>
+            <a:r>
+              <a:rPr lang="it-IT" sz="2200" dirty="0"/>
+              <a:t>in realtà non è così veloce (almeno per le nostre necessità)</a:t>
             </a:r>
           </a:p>
           <a:p>
@@ -3921,14 +3957,14 @@
           <a:p>
             <a:r>
               <a:rPr lang="it-IT" sz="2400" dirty="0"/>
-              <a:t>Node.js esplorava i nodi più velocemente di C</a:t>
+              <a:t>Node.js («spaghetti-code») esplorava i nodi più velocemente di C (ad «oggetti»)</a:t>
             </a:r>
           </a:p>
           <a:p>
             <a:pPr lvl="1"/>
             <a:r>
               <a:rPr lang="it-IT" sz="2200" dirty="0"/>
-              <a:t>Inoltre se vi è piaciuto il corso di Denti usare le funzioni come first-class </a:t>
+              <a:t>Inoltre se vi è piaciuto il corso di Denti, usare le funzioni come first-class </a:t>
             </a:r>
             <a:r>
               <a:rPr lang="it-IT" sz="2200" dirty="0" err="1"/>
@@ -3963,6 +3999,180 @@
 </file>
 
 <file path=ppt/slides/slide4.xml><?xml version="1.0" encoding="utf-8"?>
+<p:sld xmlns:a="http://schemas.openxmlformats.org/drawingml/2006/main" xmlns:r="http://schemas.openxmlformats.org/officeDocument/2006/relationships" xmlns:p="http://schemas.openxmlformats.org/presentationml/2006/main">
+  <p:cSld>
+    <p:spTree>
+      <p:nvGrpSpPr>
+        <p:cNvPr id="1" name=""/>
+        <p:cNvGrpSpPr/>
+        <p:nvPr/>
+      </p:nvGrpSpPr>
+      <p:grpSpPr>
+        <a:xfrm>
+          <a:off x="0" y="0"/>
+          <a:ext cx="0" cy="0"/>
+          <a:chOff x="0" y="0"/>
+          <a:chExt cx="0" cy="0"/>
+        </a:xfrm>
+      </p:grpSpPr>
+      <p:sp>
+        <p:nvSpPr>
+          <p:cNvPr id="2" name="Titolo 1">
+            <a:extLst>
+              <a:ext uri="{FF2B5EF4-FFF2-40B4-BE49-F238E27FC236}">
+                <a16:creationId xmlns:a16="http://schemas.microsoft.com/office/drawing/2014/main" id="{80889D8D-C96E-4A6B-97DA-8DFC3DF9A3ED}"/>
+              </a:ext>
+            </a:extLst>
+          </p:cNvPr>
+          <p:cNvSpPr>
+            <a:spLocks noGrp="1"/>
+          </p:cNvSpPr>
+          <p:nvPr>
+            <p:ph type="title"/>
+          </p:nvPr>
+        </p:nvSpPr>
+        <p:spPr/>
+        <p:txBody>
+          <a:bodyPr/>
+          <a:lstStyle/>
+          <a:p>
+            <a:r>
+              <a:rPr lang="it-IT" dirty="0"/>
+              <a:t>JAVASCRIPT + JAVA</a:t>
+            </a:r>
+          </a:p>
+        </p:txBody>
+      </p:sp>
+      <p:sp>
+        <p:nvSpPr>
+          <p:cNvPr id="3" name="Segnaposto contenuto 2">
+            <a:extLst>
+              <a:ext uri="{FF2B5EF4-FFF2-40B4-BE49-F238E27FC236}">
+                <a16:creationId xmlns:a16="http://schemas.microsoft.com/office/drawing/2014/main" id="{1BCD986E-49CA-4DF4-AC5D-6A866C8C7C01}"/>
+              </a:ext>
+            </a:extLst>
+          </p:cNvPr>
+          <p:cNvSpPr>
+            <a:spLocks noGrp="1"/>
+          </p:cNvSpPr>
+          <p:nvPr>
+            <p:ph idx="1"/>
+          </p:nvPr>
+        </p:nvSpPr>
+        <p:spPr>
+          <a:xfrm>
+            <a:off x="2231136" y="2638044"/>
+            <a:ext cx="7729728" cy="3701210"/>
+          </a:xfrm>
+        </p:spPr>
+        <p:txBody>
+          <a:bodyPr>
+            <a:normAutofit lnSpcReduction="10000"/>
+          </a:bodyPr>
+          <a:lstStyle/>
+          <a:p>
+            <a:r>
+              <a:rPr lang="it-IT" dirty="0"/>
+              <a:t>La soluzione che abbiamo deciso di adottare è stata:</a:t>
+            </a:r>
+          </a:p>
+          <a:p>
+            <a:pPr lvl="1"/>
+            <a:r>
+              <a:rPr lang="it-IT" dirty="0"/>
+              <a:t>Agente di gioco: </a:t>
+            </a:r>
+            <a:r>
+              <a:rPr lang="it-IT" dirty="0" err="1"/>
+              <a:t>Javascript</a:t>
+            </a:r>
+            <a:endParaRPr lang="it-IT" dirty="0"/>
+          </a:p>
+          <a:p>
+            <a:pPr lvl="2"/>
+            <a:r>
+              <a:rPr lang="it-IT" dirty="0"/>
+              <a:t>Maggior velocità di esecuzione</a:t>
+            </a:r>
+          </a:p>
+          <a:p>
+            <a:pPr lvl="2"/>
+            <a:r>
+              <a:rPr lang="it-IT" dirty="0"/>
+              <a:t>Maggior espressività e facilità di utilizzo del linguaggio</a:t>
+            </a:r>
+          </a:p>
+          <a:p>
+            <a:pPr lvl="1"/>
+            <a:r>
+              <a:rPr lang="it-IT" dirty="0"/>
+              <a:t>Client di gioco: </a:t>
+            </a:r>
+            <a:r>
+              <a:rPr lang="it-IT" dirty="0" err="1"/>
+              <a:t>Javascript</a:t>
+            </a:r>
+            <a:endParaRPr lang="it-IT" dirty="0"/>
+          </a:p>
+          <a:p>
+            <a:pPr lvl="2"/>
+            <a:r>
+              <a:rPr lang="it-IT" dirty="0"/>
+              <a:t>Oggetti </a:t>
+            </a:r>
+            <a:r>
+              <a:rPr lang="it-IT" dirty="0" err="1"/>
+              <a:t>Javascript</a:t>
+            </a:r>
+            <a:r>
+              <a:rPr lang="it-IT" dirty="0"/>
+              <a:t> verso Agente di gioco</a:t>
+            </a:r>
+          </a:p>
+          <a:p>
+            <a:pPr lvl="2"/>
+            <a:r>
+              <a:rPr lang="it-IT" dirty="0"/>
+              <a:t>Stringhe verso Client/Server Proxy</a:t>
+            </a:r>
+          </a:p>
+          <a:p>
+            <a:pPr lvl="1"/>
+            <a:r>
+              <a:rPr lang="it-IT" dirty="0"/>
+              <a:t>Client/Server Proxy: Java</a:t>
+            </a:r>
+          </a:p>
+          <a:p>
+            <a:pPr lvl="2"/>
+            <a:r>
+              <a:rPr lang="it-IT" dirty="0"/>
+              <a:t>Oggetti Java verso Server di gioco</a:t>
+            </a:r>
+          </a:p>
+          <a:p>
+            <a:pPr lvl="2"/>
+            <a:r>
+              <a:rPr lang="it-IT" dirty="0"/>
+              <a:t>Stringhe verso Agente di gioco</a:t>
+            </a:r>
+          </a:p>
+        </p:txBody>
+      </p:sp>
+    </p:spTree>
+    <p:extLst>
+      <p:ext uri="{BB962C8B-B14F-4D97-AF65-F5344CB8AC3E}">
+        <p14:creationId xmlns:p14="http://schemas.microsoft.com/office/powerpoint/2010/main" val="2892112357"/>
+      </p:ext>
+    </p:extLst>
+  </p:cSld>
+  <p:clrMapOvr>
+    <a:masterClrMapping/>
+  </p:clrMapOvr>
+</p:sld>
+</file>
+
+<file path=ppt/slides/slide5.xml><?xml version="1.0" encoding="utf-8"?>
 <p:sld xmlns:a="http://schemas.openxmlformats.org/drawingml/2006/main" xmlns:r="http://schemas.openxmlformats.org/officeDocument/2006/relationships" xmlns:p="http://schemas.openxmlformats.org/presentationml/2006/main">
   <p:cSld>
     <p:spTree>
@@ -4106,7 +4316,7 @@
 </p:sld>
 </file>
 
-<file path=ppt/slides/slide5.xml><?xml version="1.0" encoding="utf-8"?>
+<file path=ppt/slides/slide6.xml><?xml version="1.0" encoding="utf-8"?>
 <p:sld xmlns:a="http://schemas.openxmlformats.org/drawingml/2006/main" xmlns:r="http://schemas.openxmlformats.org/officeDocument/2006/relationships" xmlns:p="http://schemas.openxmlformats.org/presentationml/2006/main">
   <p:cSld>
     <p:spTree>
@@ -4435,7 +4645,7 @@
 </p:sld>
 </file>
 
-<file path=ppt/slides/slide6.xml><?xml version="1.0" encoding="utf-8"?>
+<file path=ppt/slides/slide7.xml><?xml version="1.0" encoding="utf-8"?>
 <p:sld xmlns:a="http://schemas.openxmlformats.org/drawingml/2006/main" xmlns:r="http://schemas.openxmlformats.org/officeDocument/2006/relationships" xmlns:p="http://schemas.openxmlformats.org/presentationml/2006/main">
   <p:cSld>
     <p:spTree>
@@ -4575,7 +4785,7 @@
 </p:sld>
 </file>
 
-<file path=ppt/slides/slide7.xml><?xml version="1.0" encoding="utf-8"?>
+<file path=ppt/slides/slide8.xml><?xml version="1.0" encoding="utf-8"?>
 <p:sld xmlns:a="http://schemas.openxmlformats.org/drawingml/2006/main" xmlns:r="http://schemas.openxmlformats.org/officeDocument/2006/relationships" xmlns:p="http://schemas.openxmlformats.org/presentationml/2006/main">
   <p:cSld>
     <p:spTree>
@@ -4706,7 +4916,7 @@
 </p:sld>
 </file>
 
-<file path=ppt/slides/slide8.xml><?xml version="1.0" encoding="utf-8"?>
+<file path=ppt/slides/slide9.xml><?xml version="1.0" encoding="utf-8"?>
 <p:sld xmlns:a="http://schemas.openxmlformats.org/drawingml/2006/main" xmlns:r="http://schemas.openxmlformats.org/officeDocument/2006/relationships" xmlns:p="http://schemas.openxmlformats.org/presentationml/2006/main">
   <p:cSld>
     <p:spTree>

</xml_diff>

<commit_message>
Add slide on testing
</commit_message>
<xml_diff>
--- a/presentazione.pptx
+++ b/presentazione.pptx
@@ -14,6 +14,7 @@
     <p:sldId id="261" r:id="rId8"/>
     <p:sldId id="262" r:id="rId9"/>
     <p:sldId id="263" r:id="rId10"/>
+    <p:sldId id="265" r:id="rId11"/>
   </p:sldIdLst>
   <p:sldSz cx="12192000" cy="6858000"/>
   <p:notesSz cx="6858000" cy="9144000"/>
@@ -390,7 +391,7 @@
           <a:p>
             <a:fld id="{1160EA64-D806-43AC-9DF2-F8C432F32B4C}" type="datetimeFigureOut">
               <a:rPr lang="en-US" dirty="0"/>
-              <a:t>6/4/2018</a:t>
+              <a:t>6/5/2018</a:t>
             </a:fld>
             <a:endParaRPr lang="en-US" dirty="0"/>
           </a:p>
@@ -556,7 +557,7 @@
           <a:p>
             <a:fld id="{E9F9C37B-1D36-470B-8223-D6C91242EC14}" type="datetimeFigureOut">
               <a:rPr lang="en-US" dirty="0"/>
-              <a:t>6/4/2018</a:t>
+              <a:t>6/5/2018</a:t>
             </a:fld>
             <a:endParaRPr lang="en-US" dirty="0"/>
           </a:p>
@@ -731,7 +732,7 @@
           <a:p>
             <a:fld id="{67C6F52A-A82B-47A2-A83A-8C4C91F2D59F}" type="datetimeFigureOut">
               <a:rPr lang="en-US" dirty="0"/>
-              <a:t>6/4/2018</a:t>
+              <a:t>6/5/2018</a:t>
             </a:fld>
             <a:endParaRPr lang="en-US" dirty="0"/>
           </a:p>
@@ -896,7 +897,7 @@
           <a:p>
             <a:fld id="{F070A7B3-6521-4DCA-87E5-044747A908C1}" type="datetimeFigureOut">
               <a:rPr lang="en-US" dirty="0"/>
-              <a:t>6/4/2018</a:t>
+              <a:t>6/5/2018</a:t>
             </a:fld>
             <a:endParaRPr lang="en-US" dirty="0"/>
           </a:p>
@@ -1160,7 +1161,7 @@
           <a:p>
             <a:fld id="{1160EA64-D806-43AC-9DF2-F8C432F32B4C}" type="datetimeFigureOut">
               <a:rPr lang="en-US" dirty="0"/>
-              <a:t>6/4/2018</a:t>
+              <a:t>6/5/2018</a:t>
             </a:fld>
             <a:endParaRPr lang="en-US" dirty="0"/>
           </a:p>
@@ -1388,7 +1389,7 @@
           <a:p>
             <a:fld id="{AB134690-1557-4C89-A502-4959FE7FAD70}" type="datetimeFigureOut">
               <a:rPr lang="en-US" dirty="0"/>
-              <a:t>6/4/2018</a:t>
+              <a:t>6/5/2018</a:t>
             </a:fld>
             <a:endParaRPr lang="en-US" dirty="0"/>
           </a:p>
@@ -1738,7 +1739,7 @@
           <a:p>
             <a:fld id="{4F7D4976-E339-4826-83B7-FBD03F55ECF8}" type="datetimeFigureOut">
               <a:rPr lang="en-US" dirty="0"/>
-              <a:t>6/4/2018</a:t>
+              <a:t>6/5/2018</a:t>
             </a:fld>
             <a:endParaRPr lang="en-US" dirty="0"/>
           </a:p>
@@ -1874,7 +1875,7 @@
           <a:p>
             <a:fld id="{E1037C31-9E7A-4F99-8774-A0E530DE1A42}" type="datetimeFigureOut">
               <a:rPr lang="en-US" dirty="0"/>
-              <a:t>6/4/2018</a:t>
+              <a:t>6/5/2018</a:t>
             </a:fld>
             <a:endParaRPr lang="en-US" dirty="0"/>
           </a:p>
@@ -1964,7 +1965,7 @@
           <a:p>
             <a:fld id="{C278504F-A551-4DE0-9316-4DCD1D8CC752}" type="datetimeFigureOut">
               <a:rPr lang="en-US" dirty="0"/>
-              <a:t>6/4/2018</a:t>
+              <a:t>6/5/2018</a:t>
             </a:fld>
             <a:endParaRPr lang="en-US" dirty="0"/>
           </a:p>
@@ -2316,7 +2317,7 @@
           <a:p>
             <a:fld id="{1160EA64-D806-43AC-9DF2-F8C432F32B4C}" type="datetimeFigureOut">
               <a:rPr lang="en-US" dirty="0"/>
-              <a:t>6/4/2018</a:t>
+              <a:t>6/5/2018</a:t>
             </a:fld>
             <a:endParaRPr lang="en-US" dirty="0"/>
           </a:p>
@@ -2669,7 +2670,7 @@
             <a:fld id="{1160EA64-D806-43AC-9DF2-F8C432F32B4C}" type="datetimeFigureOut">
               <a:rPr lang="en-US" dirty="0"/>
               <a:pPr/>
-              <a:t>6/4/2018</a:t>
+              <a:t>6/5/2018</a:t>
             </a:fld>
             <a:endParaRPr lang="en-US" dirty="0"/>
           </a:p>
@@ -2904,7 +2905,7 @@
           <a:p>
             <a:fld id="{1160EA64-D806-43AC-9DF2-F8C432F32B4C}" type="datetimeFigureOut">
               <a:rPr lang="en-US" dirty="0"/>
-              <a:t>6/4/2018</a:t>
+              <a:t>6/5/2018</a:t>
             </a:fld>
             <a:endParaRPr lang="en-US" dirty="0"/>
           </a:p>
@@ -3672,6 +3673,151 @@
 </p:sld>
 </file>
 
+<file path=ppt/slides/slide10.xml><?xml version="1.0" encoding="utf-8"?>
+<p:sld xmlns:a="http://schemas.openxmlformats.org/drawingml/2006/main" xmlns:r="http://schemas.openxmlformats.org/officeDocument/2006/relationships" xmlns:p="http://schemas.openxmlformats.org/presentationml/2006/main">
+  <p:cSld>
+    <p:spTree>
+      <p:nvGrpSpPr>
+        <p:cNvPr id="1" name=""/>
+        <p:cNvGrpSpPr/>
+        <p:nvPr/>
+      </p:nvGrpSpPr>
+      <p:grpSpPr>
+        <a:xfrm>
+          <a:off x="0" y="0"/>
+          <a:ext cx="0" cy="0"/>
+          <a:chOff x="0" y="0"/>
+          <a:chExt cx="0" cy="0"/>
+        </a:xfrm>
+      </p:grpSpPr>
+      <p:sp>
+        <p:nvSpPr>
+          <p:cNvPr id="2" name="Titolo 1">
+            <a:extLst>
+              <a:ext uri="{FF2B5EF4-FFF2-40B4-BE49-F238E27FC236}">
+                <a16:creationId xmlns:a16="http://schemas.microsoft.com/office/drawing/2014/main" id="{95870C48-4CE9-418B-AB04-B8320CD832B5}"/>
+              </a:ext>
+            </a:extLst>
+          </p:cNvPr>
+          <p:cNvSpPr>
+            <a:spLocks noGrp="1"/>
+          </p:cNvSpPr>
+          <p:nvPr>
+            <p:ph type="title"/>
+          </p:nvPr>
+        </p:nvSpPr>
+        <p:spPr/>
+        <p:txBody>
+          <a:bodyPr/>
+          <a:lstStyle/>
+          <a:p>
+            <a:r>
+              <a:rPr lang="it-IT" dirty="0" err="1"/>
+              <a:t>Testing</a:t>
+            </a:r>
+            <a:r>
+              <a:rPr lang="it-IT" dirty="0"/>
+              <a:t> &amp; </a:t>
+            </a:r>
+            <a:r>
+              <a:rPr lang="it-IT" dirty="0" err="1"/>
+              <a:t>DEBUGGing</a:t>
+            </a:r>
+            <a:endParaRPr lang="it-IT" dirty="0"/>
+          </a:p>
+        </p:txBody>
+      </p:sp>
+      <p:sp>
+        <p:nvSpPr>
+          <p:cNvPr id="3" name="Segnaposto contenuto 2">
+            <a:extLst>
+              <a:ext uri="{FF2B5EF4-FFF2-40B4-BE49-F238E27FC236}">
+                <a16:creationId xmlns:a16="http://schemas.microsoft.com/office/drawing/2014/main" id="{664BAF93-C9BE-477E-BFA1-2DF2540C5E63}"/>
+              </a:ext>
+            </a:extLst>
+          </p:cNvPr>
+          <p:cNvSpPr>
+            <a:spLocks noGrp="1"/>
+          </p:cNvSpPr>
+          <p:nvPr>
+            <p:ph idx="1"/>
+          </p:nvPr>
+        </p:nvSpPr>
+        <p:spPr/>
+        <p:txBody>
+          <a:bodyPr/>
+          <a:lstStyle/>
+          <a:p>
+            <a:r>
+              <a:rPr lang="it-IT" dirty="0"/>
+              <a:t>Per risolvere alcune mosse «illegali» abbiamo implementato uno script di test</a:t>
+            </a:r>
+          </a:p>
+          <a:p>
+            <a:pPr lvl="1"/>
+            <a:r>
+              <a:rPr lang="it-IT" dirty="0"/>
+              <a:t>Lo stato del gioco viene inizializzato manualmente</a:t>
+            </a:r>
+          </a:p>
+          <a:p>
+            <a:pPr lvl="1"/>
+            <a:r>
+              <a:rPr lang="it-IT" dirty="0"/>
+              <a:t>Si ottengono le azioni per un giocatore, a partire da tale stato</a:t>
+            </a:r>
+          </a:p>
+          <a:p>
+            <a:pPr marL="228600" lvl="1" indent="0">
+              <a:buNone/>
+            </a:pPr>
+            <a:endParaRPr lang="it-IT" dirty="0"/>
+          </a:p>
+        </p:txBody>
+      </p:sp>
+      <p:pic>
+        <p:nvPicPr>
+          <p:cNvPr id="4" name="Immagine 3">
+            <a:extLst>
+              <a:ext uri="{FF2B5EF4-FFF2-40B4-BE49-F238E27FC236}">
+                <a16:creationId xmlns:a16="http://schemas.microsoft.com/office/drawing/2014/main" id="{C81B6566-6C1E-47DF-BEA8-EC8759973CC2}"/>
+              </a:ext>
+            </a:extLst>
+          </p:cNvPr>
+          <p:cNvPicPr>
+            <a:picLocks noChangeAspect="1"/>
+          </p:cNvPicPr>
+          <p:nvPr/>
+        </p:nvPicPr>
+        <p:blipFill>
+          <a:blip r:embed="rId2"/>
+          <a:stretch>
+            <a:fillRect/>
+          </a:stretch>
+        </p:blipFill>
+        <p:spPr>
+          <a:xfrm>
+            <a:off x="1890712" y="3947401"/>
+            <a:ext cx="8410575" cy="2277258"/>
+          </a:xfrm>
+          <a:prstGeom prst="rect">
+            <a:avLst/>
+          </a:prstGeom>
+        </p:spPr>
+      </p:pic>
+    </p:spTree>
+    <p:extLst>
+      <p:ext uri="{BB962C8B-B14F-4D97-AF65-F5344CB8AC3E}">
+        <p14:creationId xmlns:p14="http://schemas.microsoft.com/office/powerpoint/2010/main" val="2101327094"/>
+      </p:ext>
+    </p:extLst>
+  </p:cSld>
+  <p:clrMapOvr>
+    <a:masterClrMapping/>
+  </p:clrMapOvr>
+</p:sld>
+</file>
+
 <file path=ppt/slides/slide2.xml><?xml version="1.0" encoding="utf-8"?>
 <p:sld xmlns:a="http://schemas.openxmlformats.org/drawingml/2006/main" xmlns:r="http://schemas.openxmlformats.org/officeDocument/2006/relationships" xmlns:p="http://schemas.openxmlformats.org/presentationml/2006/main">
   <p:cSld>
@@ -3750,6 +3896,15 @@
           </a:bodyPr>
           <a:lstStyle/>
           <a:p>
+            <a:pPr marL="0" indent="0">
+              <a:buNone/>
+            </a:pPr>
+            <a:r>
+              <a:rPr lang="it-IT" sz="2400" dirty="0"/>
+              <a:t>Eravamo indecisi su quale linguaggio usare. </a:t>
+            </a:r>
+          </a:p>
+          <a:p>
             <a:r>
               <a:rPr lang="it-IT" sz="2400" dirty="0"/>
               <a:t>Julia?</a:t>
@@ -3777,7 +3932,24 @@
             </a:pPr>
             <a:r>
               <a:rPr lang="it-IT" sz="2400" dirty="0"/>
-              <a:t>Eravamo indecisi su quale linguaggio usare. Quindi abbiamo fatto una ricerca e dei benchmark.</a:t>
+              <a:t>L’unica cosa che sapevamo, era che doveva iniziare con la lettera «J».</a:t>
+            </a:r>
+          </a:p>
+          <a:p>
+            <a:pPr marL="0" indent="0">
+              <a:buNone/>
+            </a:pPr>
+            <a:r>
+              <a:rPr lang="it-IT" sz="2400" dirty="0"/>
+              <a:t>Quindi abbiamo fatto una ricerca e dei benchmark, facendo un semplice giocatore </a:t>
+            </a:r>
+            <a:r>
+              <a:rPr lang="it-IT" sz="2400" dirty="0" err="1"/>
+              <a:t>minmax</a:t>
+            </a:r>
+            <a:r>
+              <a:rPr lang="it-IT" sz="2400" dirty="0"/>
+              <a:t> per il Tris.</a:t>
             </a:r>
           </a:p>
           <a:p>
@@ -3872,7 +4044,7 @@
         </p:spPr>
         <p:txBody>
           <a:bodyPr>
-            <a:normAutofit fontScale="92500" lnSpcReduction="20000"/>
+            <a:normAutofit/>
           </a:bodyPr>
           <a:lstStyle/>
           <a:p>
@@ -3881,15 +4053,7 @@
             </a:pPr>
             <a:r>
               <a:rPr lang="it-IT" sz="2400" dirty="0"/>
-              <a:t>Eravamo indecisi su quale linguaggio usare. Quindi abbiamo fatto una ricerca e dei benchmark, facendo un semplice giocatore </a:t>
-            </a:r>
-            <a:r>
-              <a:rPr lang="it-IT" sz="2400" dirty="0" err="1"/>
-              <a:t>minmax</a:t>
-            </a:r>
-            <a:r>
-              <a:rPr lang="it-IT" sz="2400" dirty="0"/>
-              <a:t> per il Tris</a:t>
+              <a:t>Come baseline, abbiamo utilizzato un giocatore scritto in C (il più veloce e più noioso)</a:t>
             </a:r>
           </a:p>
           <a:p>
@@ -3945,26 +4109,24 @@
           <a:p>
             <a:r>
               <a:rPr lang="it-IT" sz="2400" dirty="0"/>
-              <a:t>Java è lentino (e noioso)</a:t>
-            </a:r>
-          </a:p>
-          <a:p>
+              <a:t>Java è ok, però è lentino (e noioso)</a:t>
+            </a:r>
+          </a:p>
+          <a:p>
+            <a:r>
+              <a:rPr lang="it-IT" sz="2400" dirty="0" err="1"/>
+              <a:t>Javascript</a:t>
+            </a:r>
             <a:r>
               <a:rPr lang="it-IT" sz="2400" dirty="0"/>
-              <a:t>C è più veloce (e più noioso)</a:t>
-            </a:r>
-          </a:p>
-          <a:p>
-            <a:r>
-              <a:rPr lang="it-IT" sz="2400" dirty="0"/>
-              <a:t>Node.js («spaghetti-code») esplorava i nodi più velocemente di C (ad «oggetti»)</a:t>
+              <a:t> («spaghetti-code» su V8) è risultato più veloce di C (ad «oggetti»)</a:t>
             </a:r>
           </a:p>
           <a:p>
             <a:pPr lvl="1"/>
             <a:r>
               <a:rPr lang="it-IT" sz="2200" dirty="0"/>
-              <a:t>Inoltre se vi è piaciuto il corso di Denti, usare le funzioni come first-class </a:t>
+              <a:t>Inoltre, se vi è piaciuto il corso di Denti, usare le funzioni come first-class </a:t>
             </a:r>
             <a:r>
               <a:rPr lang="it-IT" sz="2200" dirty="0" err="1"/>
@@ -4086,7 +4248,10 @@
               <a:rPr lang="it-IT" dirty="0" err="1"/>
               <a:t>Javascript</a:t>
             </a:r>
-            <a:endParaRPr lang="it-IT" dirty="0"/>
+            <a:r>
+              <a:rPr lang="it-IT" dirty="0"/>
+              <a:t> su Node.js</a:t>
+            </a:r>
           </a:p>
           <a:p>
             <a:pPr lvl="2"/>
@@ -4112,7 +4277,10 @@
               <a:rPr lang="it-IT" dirty="0" err="1"/>
               <a:t>Javascript</a:t>
             </a:r>
-            <a:endParaRPr lang="it-IT" dirty="0"/>
+            <a:r>
+              <a:rPr lang="it-IT" dirty="0"/>
+              <a:t> su Node.js</a:t>
+            </a:r>
           </a:p>
           <a:p>
             <a:pPr lvl="2"/>

</xml_diff>